<commit_message>
Final changes for poster
</commit_message>
<xml_diff>
--- a/FinalPresentationV3.pptx
+++ b/FinalPresentationV3.pptx
@@ -1078,12 +1078,11 @@
               <a:buFontTx/>
               <a:buNone/>
               <a:tabLst/>
-              <a:defRPr sz="6000" b="0" i="0" u="none" strike="noStrike" kern="1200" spc="0" baseline="0">
+              <a:defRPr sz="6000">
                 <a:solidFill>
                   <a:prstClr val="black"/>
                 </a:solidFill>
                 <a:latin typeface="Times New Roman" panose="02020603050405020304" pitchFamily="18" charset="0"/>
-                <a:ea typeface="+mn-ea"/>
                 <a:cs typeface="Times New Roman" panose="02020603050405020304" pitchFamily="18" charset="0"/>
               </a:defRPr>
             </a:pPr>
@@ -1114,12 +1113,11 @@
               <a:buFontTx/>
               <a:buNone/>
               <a:tabLst/>
-              <a:defRPr sz="6000" b="0" i="0" u="none" strike="noStrike" kern="1200" spc="0" baseline="0">
+              <a:defRPr sz="6000">
                 <a:solidFill>
                   <a:prstClr val="black"/>
                 </a:solidFill>
                 <a:latin typeface="Times New Roman" panose="02020603050405020304" pitchFamily="18" charset="0"/>
-                <a:ea typeface="+mn-ea"/>
                 <a:cs typeface="Times New Roman" panose="02020603050405020304" pitchFamily="18" charset="0"/>
               </a:defRPr>
             </a:pPr>
@@ -3098,7 +3096,7 @@
             <a:fld id="{0158C5BC-9A70-462C-B28D-9600239EAC64}" type="datetimeFigureOut">
               <a:rPr lang="en-US" smtClean="0"/>
               <a:pPr/>
-              <a:t>12/6/2022</a:t>
+              <a:t>12/7/2022</a:t>
             </a:fld>
             <a:endParaRPr lang="en-US"/>
           </a:p>
@@ -3265,7 +3263,7 @@
             <a:fld id="{E6CC2317-6751-4CD4-9995-8782DD78E936}" type="datetimeFigureOut">
               <a:rPr lang="en-US" smtClean="0"/>
               <a:pPr/>
-              <a:t>12/6/2022</a:t>
+              <a:t>12/7/2022</a:t>
             </a:fld>
             <a:endParaRPr lang="en-US" dirty="0"/>
           </a:p>
@@ -9994,7 +9992,7 @@
         <p:spPr>
           <a:xfrm>
             <a:off x="36477431" y="6628573"/>
-            <a:ext cx="6675020" cy="8433078"/>
+            <a:ext cx="6675020" cy="8156079"/>
           </a:xfrm>
           <a:prstGeom prst="rect">
             <a:avLst/>
@@ -10152,7 +10150,14 @@
                 <a:latin typeface="Times New Roman" panose="02020603050405020304" pitchFamily="18" charset="0"/>
                 <a:cs typeface="Times New Roman" panose="02020603050405020304" pitchFamily="18" charset="0"/>
               </a:rPr>
-              <a:t>    Our first metric, EMS Travel Time, shows that both the Green Corridor and Red Freeze traffic policies decrease the travel time of EMS vehicle, with Green Corridor reducing it by 47.25%.</a:t>
+              <a:t>    </a:t>
+            </a:r>
+            <a:r>
+              <a:rPr lang="en-US" sz="4800" dirty="0">
+                <a:latin typeface="Times New Roman" panose="02020603050405020304" pitchFamily="18" charset="0"/>
+                <a:cs typeface="Times New Roman" panose="02020603050405020304" pitchFamily="18" charset="0"/>
+              </a:rPr>
+              <a:t>Our first metric, EMS Travel Time, shows that both the Green Corridor and Red Freeze traffic policies decrease the travel time of EMS vehicle, with the Green Corridor reducing it by 47.25% in heavy traffic.</a:t>
             </a:r>
           </a:p>
         </p:txBody>
@@ -10299,7 +10304,7 @@
         <p:spPr>
           <a:xfrm>
             <a:off x="458599" y="12165090"/>
-            <a:ext cx="10059099" cy="1015663"/>
+            <a:ext cx="10059099" cy="923330"/>
           </a:xfrm>
         </p:spPr>
         <p:txBody>
@@ -10308,7 +10313,7 @@
           <a:p>
             <a:pPr algn="l"/>
             <a:r>
-              <a:rPr lang="en-US" sz="6000" dirty="0"/>
+              <a:rPr lang="en-US" sz="5400" dirty="0"/>
               <a:t> Objectives</a:t>
             </a:r>
           </a:p>
@@ -10831,8 +10836,8 @@
         </p:nvSpPr>
         <p:spPr>
           <a:xfrm>
-            <a:off x="459299" y="18499756"/>
-            <a:ext cx="10058399" cy="6567952"/>
+            <a:off x="459299" y="18248725"/>
+            <a:ext cx="10058399" cy="7860613"/>
           </a:xfrm>
           <a:prstGeom prst="rect">
             <a:avLst/>
@@ -11007,7 +11012,7 @@
                 <a:latin typeface="Times New Roman" panose="02020603050405020304" pitchFamily="18" charset="0"/>
                 <a:cs typeface="Times New Roman" panose="02020603050405020304" pitchFamily="18" charset="0"/>
               </a:rPr>
-              <a:t>This policy activates green lights for the next three signals in the EMS vehicle’s route.</a:t>
+              <a:t>This policy activates green lights for the next three signals in the EMS vehicle’s route. The signals resume normal operation after the EMS vehicle passes each intersection.</a:t>
             </a:r>
           </a:p>
           <a:p>
@@ -11278,7 +11283,7 @@
         <p:spPr>
           <a:xfrm>
             <a:off x="455798" y="17659767"/>
-            <a:ext cx="10058400" cy="1015663"/>
+            <a:ext cx="10058400" cy="923330"/>
           </a:xfrm>
           <a:prstGeom prst="rect">
             <a:avLst/>
@@ -11435,7 +11440,7 @@
           <a:p>
             <a:pPr algn="l"/>
             <a:r>
-              <a:rPr lang="en-US" sz="6000" dirty="0"/>
+              <a:rPr lang="en-US" sz="5400" dirty="0"/>
               <a:t> Traffic Signal Policies</a:t>
             </a:r>
           </a:p>
@@ -11457,8 +11462,8 @@
         </p:nvSpPr>
         <p:spPr>
           <a:xfrm>
-            <a:off x="462798" y="25680100"/>
-            <a:ext cx="10058400" cy="1015663"/>
+            <a:off x="462798" y="25837578"/>
+            <a:ext cx="10058400" cy="923330"/>
           </a:xfrm>
           <a:prstGeom prst="rect">
             <a:avLst/>
@@ -11615,7 +11620,7 @@
           <a:p>
             <a:pPr algn="l"/>
             <a:r>
-              <a:rPr lang="en-US" sz="6000" dirty="0"/>
+              <a:rPr lang="en-US" sz="5400" dirty="0"/>
               <a:t> Data Metrics to Analyze</a:t>
             </a:r>
           </a:p>
@@ -13646,7 +13651,7 @@
         <p:spPr>
           <a:xfrm>
             <a:off x="36477431" y="18167598"/>
-            <a:ext cx="6675018" cy="8556188"/>
+            <a:ext cx="6675018" cy="8217634"/>
           </a:xfrm>
           <a:prstGeom prst="rect">
             <a:avLst/>
@@ -13660,13 +13665,13 @@
           <a:lstStyle/>
           <a:p>
             <a:r>
-              <a:rPr lang="en-US" sz="5000" dirty="0">
+              <a:rPr lang="en-US" sz="4800" dirty="0">
                 <a:latin typeface="Times New Roman" panose="02020603050405020304" pitchFamily="18" charset="0"/>
                 <a:cs typeface="Times New Roman" panose="02020603050405020304" pitchFamily="18" charset="0"/>
               </a:rPr>
-              <a:t>    Our second metric, Congestion Clearing Time, shows that the traffic policies – which temporarily change the pattern of traffic signals – do not significantly increase congestion after their use. In fact, the green corridor reduces it by 9.92%. </a:t>
+              <a:t>    Our second metric, Congestion Clearing Time, shows that the traffic policies – which temporarily change the pattern of traffic signals – do not significantly increase congestion after their use. In fact, the Green Corridor reduces it by 9.92% in heavy traffic. </a:t>
             </a:r>
-            <a:endParaRPr lang="en-US" sz="5000" dirty="0"/>
+            <a:endParaRPr lang="en-US" sz="4800" dirty="0"/>
           </a:p>
         </p:txBody>
       </p:sp>

</xml_diff>